<commit_message>
Restrucutured tabs in analysis windows
</commit_message>
<xml_diff>
--- a/img/Buttons.pptx
+++ b/img/Buttons.pptx
@@ -107,7 +107,7 @@
   </p:defaultTextStyle>
   <p:extLst>
     <p:ext uri="{EFAFB233-063F-42B5-8137-9DF3F51BA10A}">
-      <p15:sldGuideLst xmlns:p15="http://schemas.microsoft.com/office/powerpoint/2012/main">
+      <p15:sldGuideLst xmlns="" xmlns:p15="http://schemas.microsoft.com/office/powerpoint/2012/main">
         <p15:guide id="1" orient="horz" pos="2160">
           <p15:clr>
             <a:srgbClr val="A4A3A4"/>
@@ -303,7 +303,7 @@
           <a:p>
             <a:fld id="{84BADF00-34E4-42BB-AA00-2CB9441AFC63}" type="datetimeFigureOut">
               <a:rPr lang="de-DE" smtClean="0"/>
-              <a:t>16.02.2020</a:t>
+              <a:t>16.03.2020</a:t>
             </a:fld>
             <a:endParaRPr lang="de-DE"/>
           </a:p>
@@ -471,7 +471,7 @@
           <a:p>
             <a:fld id="{84BADF00-34E4-42BB-AA00-2CB9441AFC63}" type="datetimeFigureOut">
               <a:rPr lang="de-DE" smtClean="0"/>
-              <a:t>16.02.2020</a:t>
+              <a:t>16.03.2020</a:t>
             </a:fld>
             <a:endParaRPr lang="de-DE"/>
           </a:p>
@@ -649,7 +649,7 @@
           <a:p>
             <a:fld id="{84BADF00-34E4-42BB-AA00-2CB9441AFC63}" type="datetimeFigureOut">
               <a:rPr lang="de-DE" smtClean="0"/>
-              <a:t>16.02.2020</a:t>
+              <a:t>16.03.2020</a:t>
             </a:fld>
             <a:endParaRPr lang="de-DE"/>
           </a:p>
@@ -817,7 +817,7 @@
           <a:p>
             <a:fld id="{84BADF00-34E4-42BB-AA00-2CB9441AFC63}" type="datetimeFigureOut">
               <a:rPr lang="de-DE" smtClean="0"/>
-              <a:t>16.02.2020</a:t>
+              <a:t>16.03.2020</a:t>
             </a:fld>
             <a:endParaRPr lang="de-DE"/>
           </a:p>
@@ -1062,7 +1062,7 @@
           <a:p>
             <a:fld id="{84BADF00-34E4-42BB-AA00-2CB9441AFC63}" type="datetimeFigureOut">
               <a:rPr lang="de-DE" smtClean="0"/>
-              <a:t>16.02.2020</a:t>
+              <a:t>16.03.2020</a:t>
             </a:fld>
             <a:endParaRPr lang="de-DE"/>
           </a:p>
@@ -1347,7 +1347,7 @@
           <a:p>
             <a:fld id="{84BADF00-34E4-42BB-AA00-2CB9441AFC63}" type="datetimeFigureOut">
               <a:rPr lang="de-DE" smtClean="0"/>
-              <a:t>16.02.2020</a:t>
+              <a:t>16.03.2020</a:t>
             </a:fld>
             <a:endParaRPr lang="de-DE"/>
           </a:p>
@@ -1766,7 +1766,7 @@
           <a:p>
             <a:fld id="{84BADF00-34E4-42BB-AA00-2CB9441AFC63}" type="datetimeFigureOut">
               <a:rPr lang="de-DE" smtClean="0"/>
-              <a:t>16.02.2020</a:t>
+              <a:t>16.03.2020</a:t>
             </a:fld>
             <a:endParaRPr lang="de-DE"/>
           </a:p>
@@ -1883,7 +1883,7 @@
           <a:p>
             <a:fld id="{84BADF00-34E4-42BB-AA00-2CB9441AFC63}" type="datetimeFigureOut">
               <a:rPr lang="de-DE" smtClean="0"/>
-              <a:t>16.02.2020</a:t>
+              <a:t>16.03.2020</a:t>
             </a:fld>
             <a:endParaRPr lang="de-DE"/>
           </a:p>
@@ -1978,7 +1978,7 @@
           <a:p>
             <a:fld id="{84BADF00-34E4-42BB-AA00-2CB9441AFC63}" type="datetimeFigureOut">
               <a:rPr lang="de-DE" smtClean="0"/>
-              <a:t>16.02.2020</a:t>
+              <a:t>16.03.2020</a:t>
             </a:fld>
             <a:endParaRPr lang="de-DE"/>
           </a:p>
@@ -2253,7 +2253,7 @@
           <a:p>
             <a:fld id="{84BADF00-34E4-42BB-AA00-2CB9441AFC63}" type="datetimeFigureOut">
               <a:rPr lang="de-DE" smtClean="0"/>
-              <a:t>16.02.2020</a:t>
+              <a:t>16.03.2020</a:t>
             </a:fld>
             <a:endParaRPr lang="de-DE"/>
           </a:p>
@@ -2505,7 +2505,7 @@
           <a:p>
             <a:fld id="{84BADF00-34E4-42BB-AA00-2CB9441AFC63}" type="datetimeFigureOut">
               <a:rPr lang="de-DE" smtClean="0"/>
-              <a:t>16.02.2020</a:t>
+              <a:t>16.03.2020</a:t>
             </a:fld>
             <a:endParaRPr lang="de-DE"/>
           </a:p>
@@ -2716,7 +2716,7 @@
           <a:p>
             <a:fld id="{84BADF00-34E4-42BB-AA00-2CB9441AFC63}" type="datetimeFigureOut">
               <a:rPr lang="de-DE" smtClean="0"/>
-              <a:t>16.02.2020</a:t>
+              <a:t>16.03.2020</a:t>
             </a:fld>
             <a:endParaRPr lang="de-DE"/>
           </a:p>
@@ -3093,6 +3093,60 @@
       </p:grpSpPr>
       <p:sp>
         <p:nvSpPr>
+          <p:cNvPr id="10" name="Ellipse 9"/>
+          <p:cNvSpPr/>
+          <p:nvPr/>
+        </p:nvSpPr>
+        <p:spPr>
+          <a:xfrm>
+            <a:off x="6192180" y="800708"/>
+            <a:ext cx="1872208" cy="1890200"/>
+          </a:xfrm>
+          <a:prstGeom prst="ellipse">
+            <a:avLst/>
+          </a:prstGeom>
+          <a:solidFill>
+            <a:schemeClr val="tx1">
+              <a:lumMod val="65000"/>
+              <a:lumOff val="35000"/>
+            </a:schemeClr>
+          </a:solidFill>
+          <a:ln w="155575">
+            <a:solidFill>
+              <a:schemeClr val="tx1">
+                <a:lumMod val="65000"/>
+                <a:lumOff val="35000"/>
+              </a:schemeClr>
+            </a:solidFill>
+          </a:ln>
+        </p:spPr>
+        <p:style>
+          <a:lnRef idx="2">
+            <a:schemeClr val="accent1">
+              <a:shade val="50000"/>
+            </a:schemeClr>
+          </a:lnRef>
+          <a:fillRef idx="1">
+            <a:schemeClr val="accent1"/>
+          </a:fillRef>
+          <a:effectRef idx="0">
+            <a:schemeClr val="accent1"/>
+          </a:effectRef>
+          <a:fontRef idx="minor">
+            <a:schemeClr val="lt1"/>
+          </a:fontRef>
+        </p:style>
+        <p:txBody>
+          <a:bodyPr rtlCol="0" anchor="ctr"/>
+          <a:lstStyle/>
+          <a:p>
+            <a:pPr algn="ctr"/>
+            <a:endParaRPr lang="de-DE"/>
+          </a:p>
+        </p:txBody>
+      </p:sp>
+      <p:sp>
+        <p:nvSpPr>
           <p:cNvPr id="8" name="Ellipse 7"/>
           <p:cNvSpPr/>
           <p:nvPr/>
@@ -3366,7 +3420,7 @@
         </p:nvSpPr>
         <p:spPr>
           <a:xfrm>
-            <a:off x="1414186" y="3717032"/>
+            <a:off x="-36560" y="2888820"/>
             <a:ext cx="3024336" cy="1800200"/>
           </a:xfrm>
           <a:prstGeom prst="rect">
@@ -3430,6 +3484,162 @@
           </a:solidFill>
           <a:ln>
             <a:noFill/>
+          </a:ln>
+        </p:spPr>
+        <p:style>
+          <a:lnRef idx="2">
+            <a:schemeClr val="accent1">
+              <a:shade val="50000"/>
+            </a:schemeClr>
+          </a:lnRef>
+          <a:fillRef idx="1">
+            <a:schemeClr val="accent1"/>
+          </a:fillRef>
+          <a:effectRef idx="0">
+            <a:schemeClr val="accent1"/>
+          </a:effectRef>
+          <a:fontRef idx="minor">
+            <a:schemeClr val="lt1"/>
+          </a:fontRef>
+        </p:style>
+        <p:txBody>
+          <a:bodyPr rtlCol="0" anchor="ctr"/>
+          <a:lstStyle/>
+          <a:p>
+            <a:pPr algn="ctr"/>
+            <a:endParaRPr lang="de-DE"/>
+          </a:p>
+        </p:txBody>
+      </p:sp>
+      <p:sp>
+        <p:nvSpPr>
+          <p:cNvPr id="9" name="Kreuz 8"/>
+          <p:cNvSpPr/>
+          <p:nvPr/>
+        </p:nvSpPr>
+        <p:spPr>
+          <a:xfrm>
+            <a:off x="6444208" y="1052736"/>
+            <a:ext cx="1368152" cy="1386144"/>
+          </a:xfrm>
+          <a:prstGeom prst="plus">
+            <a:avLst>
+              <a:gd name="adj" fmla="val 39094"/>
+            </a:avLst>
+          </a:prstGeom>
+          <a:solidFill>
+            <a:srgbClr val="0070C0"/>
+          </a:solidFill>
+          <a:ln w="76200">
+            <a:solidFill>
+              <a:srgbClr val="0070C0"/>
+            </a:solidFill>
+          </a:ln>
+        </p:spPr>
+        <p:style>
+          <a:lnRef idx="2">
+            <a:schemeClr val="accent1">
+              <a:shade val="50000"/>
+            </a:schemeClr>
+          </a:lnRef>
+          <a:fillRef idx="1">
+            <a:schemeClr val="accent1"/>
+          </a:fillRef>
+          <a:effectRef idx="0">
+            <a:schemeClr val="accent1"/>
+          </a:effectRef>
+          <a:fontRef idx="minor">
+            <a:schemeClr val="lt1"/>
+          </a:fontRef>
+        </p:style>
+        <p:txBody>
+          <a:bodyPr rtlCol="0" anchor="ctr"/>
+          <a:lstStyle/>
+          <a:p>
+            <a:pPr algn="ctr"/>
+            <a:endParaRPr lang="de-DE"/>
+          </a:p>
+        </p:txBody>
+      </p:sp>
+      <p:sp>
+        <p:nvSpPr>
+          <p:cNvPr id="11" name="Rechteck 10"/>
+          <p:cNvSpPr/>
+          <p:nvPr/>
+        </p:nvSpPr>
+        <p:spPr>
+          <a:xfrm>
+            <a:off x="836294" y="5373216"/>
+            <a:ext cx="3456384" cy="792088"/>
+          </a:xfrm>
+          <a:prstGeom prst="rect">
+            <a:avLst/>
+          </a:prstGeom>
+          <a:solidFill>
+            <a:schemeClr val="tx1">
+              <a:lumMod val="65000"/>
+              <a:lumOff val="35000"/>
+            </a:schemeClr>
+          </a:solidFill>
+          <a:ln w="9525">
+            <a:solidFill>
+              <a:schemeClr val="tx1">
+                <a:lumMod val="65000"/>
+                <a:lumOff val="35000"/>
+              </a:schemeClr>
+            </a:solidFill>
+          </a:ln>
+        </p:spPr>
+        <p:style>
+          <a:lnRef idx="2">
+            <a:schemeClr val="accent1">
+              <a:shade val="50000"/>
+            </a:schemeClr>
+          </a:lnRef>
+          <a:fillRef idx="1">
+            <a:schemeClr val="accent1"/>
+          </a:fillRef>
+          <a:effectRef idx="0">
+            <a:schemeClr val="accent1"/>
+          </a:effectRef>
+          <a:fontRef idx="minor">
+            <a:schemeClr val="lt1"/>
+          </a:fontRef>
+        </p:style>
+        <p:txBody>
+          <a:bodyPr rtlCol="0" anchor="ctr"/>
+          <a:lstStyle/>
+          <a:p>
+            <a:pPr algn="ctr"/>
+            <a:endParaRPr lang="de-DE"/>
+          </a:p>
+        </p:txBody>
+      </p:sp>
+      <p:sp>
+        <p:nvSpPr>
+          <p:cNvPr id="12" name="Rechteck 11"/>
+          <p:cNvSpPr/>
+          <p:nvPr/>
+        </p:nvSpPr>
+        <p:spPr>
+          <a:xfrm>
+            <a:off x="4788024" y="5376384"/>
+            <a:ext cx="3456384" cy="792088"/>
+          </a:xfrm>
+          <a:prstGeom prst="rect">
+            <a:avLst/>
+          </a:prstGeom>
+          <a:solidFill>
+            <a:schemeClr val="tx1">
+              <a:lumMod val="65000"/>
+              <a:lumOff val="35000"/>
+            </a:schemeClr>
+          </a:solidFill>
+          <a:ln w="57150">
+            <a:solidFill>
+              <a:srgbClr val="0070C0"/>
+            </a:solidFill>
+            <a:miter lim="800000"/>
           </a:ln>
         </p:spPr>
         <p:style>

</xml_diff>